<commit_message>
Make minor correction to the One-hot coding table on slide 42
</commit_message>
<xml_diff>
--- a/lectures/Lect03_MultLinRegression.pptx
+++ b/lectures/Lect03_MultLinRegression.pptx
@@ -250,7 +250,7 @@
           <a:p>
             <a:fld id="{B7D6DDD3-D7E9-488B-B626-1E8285E424D8}" type="datetimeFigureOut">
               <a:rPr lang="en-US" smtClean="0"/>
-              <a:t>1/28/18</a:t>
+              <a:t>1/29/18</a:t>
             </a:fld>
             <a:endParaRPr lang="en-US"/>
           </a:p>
@@ -4358,8 +4358,8 @@
           </a:p>
         </p:txBody>
       </p:sp>
-      <mc:AlternateContent xmlns:mc="http://schemas.openxmlformats.org/markup-compatibility/2006">
-        <mc:Choice xmlns:a14="http://schemas.microsoft.com/office/drawing/2010/main" Requires="a14">
+      <mc:AlternateContent xmlns:mc="http://schemas.openxmlformats.org/markup-compatibility/2006" xmlns:a14="http://schemas.microsoft.com/office/drawing/2010/main">
+        <mc:Choice Requires="a14">
           <p:sp>
             <p:nvSpPr>
               <p:cNvPr id="3" name="Content Placeholder 2"/>
@@ -5260,7 +5260,7 @@
             </p:txBody>
           </p:sp>
         </mc:Choice>
-        <mc:Fallback>
+        <mc:Fallback xmlns="">
           <p:sp>
             <p:nvSpPr>
               <p:cNvPr id="3" name="Content Placeholder 2"/>
@@ -9980,8 +9980,8 @@
           </a:p>
         </p:txBody>
       </p:sp>
-      <mc:AlternateContent xmlns:mc="http://schemas.openxmlformats.org/markup-compatibility/2006">
-        <mc:Choice xmlns:a14="http://schemas.microsoft.com/office/drawing/2010/main" Requires="a14">
+      <mc:AlternateContent xmlns:mc="http://schemas.openxmlformats.org/markup-compatibility/2006" xmlns:a14="http://schemas.microsoft.com/office/drawing/2010/main">
+        <mc:Choice Requires="a14">
           <p:sp>
             <p:nvSpPr>
               <p:cNvPr id="5" name="Content Placeholder 2">
@@ -10876,7 +10876,7 @@
             </p:txBody>
           </p:sp>
         </mc:Choice>
-        <mc:Fallback>
+        <mc:Fallback xmlns="">
           <p:sp>
             <p:nvSpPr>
               <p:cNvPr id="5" name="Content Placeholder 2">
@@ -17336,8 +17336,8 @@
           </a:p>
         </p:txBody>
       </p:sp>
-      <mc:AlternateContent xmlns:mc="http://schemas.openxmlformats.org/markup-compatibility/2006">
-        <mc:Choice xmlns:a14="http://schemas.microsoft.com/office/drawing/2010/main" Requires="a14">
+      <mc:AlternateContent xmlns:mc="http://schemas.openxmlformats.org/markup-compatibility/2006" xmlns:a14="http://schemas.microsoft.com/office/drawing/2010/main">
+        <mc:Choice Requires="a14">
           <p:sp>
             <p:nvSpPr>
               <p:cNvPr id="3" name="Content Placeholder 2">
@@ -18789,7 +18789,7 @@
             </p:txBody>
           </p:sp>
         </mc:Choice>
-        <mc:Fallback>
+        <mc:Fallback xmlns="">
           <p:sp>
             <p:nvSpPr>
               <p:cNvPr id="3" name="Content Placeholder 2">
@@ -18912,8 +18912,8 @@
           </a:p>
         </p:txBody>
       </p:sp>
-      <mc:AlternateContent xmlns:mc="http://schemas.openxmlformats.org/markup-compatibility/2006">
-        <mc:Choice xmlns:a14="http://schemas.microsoft.com/office/drawing/2010/main" Requires="a14">
+      <mc:AlternateContent xmlns:mc="http://schemas.openxmlformats.org/markup-compatibility/2006" xmlns:a14="http://schemas.microsoft.com/office/drawing/2010/main">
+        <mc:Choice Requires="a14">
           <p:sp>
             <p:nvSpPr>
               <p:cNvPr id="3" name="Content Placeholder 2"/>
@@ -20969,7 +20969,7 @@
             </p:txBody>
           </p:sp>
         </mc:Choice>
-        <mc:Fallback>
+        <mc:Fallback xmlns="">
           <p:sp>
             <p:nvSpPr>
               <p:cNvPr id="3" name="Content Placeholder 2"/>
@@ -25983,8 +25983,8 @@
           </a:p>
         </p:txBody>
       </p:sp>
-      <mc:AlternateContent xmlns:mc="http://schemas.openxmlformats.org/markup-compatibility/2006">
-        <mc:Choice xmlns:a14="http://schemas.microsoft.com/office/drawing/2010/main" Requires="a14">
+      <mc:AlternateContent xmlns:mc="http://schemas.openxmlformats.org/markup-compatibility/2006" xmlns:a14="http://schemas.microsoft.com/office/drawing/2010/main">
+        <mc:Choice Requires="a14">
           <p:sp>
             <p:nvSpPr>
               <p:cNvPr id="3" name="Content Placeholder 2"/>
@@ -26986,7 +26986,7 @@
             </p:txBody>
           </p:sp>
         </mc:Choice>
-        <mc:Fallback>
+        <mc:Fallback xmlns="">
           <p:sp>
             <p:nvSpPr>
               <p:cNvPr id="3" name="Content Placeholder 2"/>
@@ -27123,8 +27123,8 @@
           </a:p>
         </p:txBody>
       </p:sp>
-      <mc:AlternateContent xmlns:mc="http://schemas.openxmlformats.org/markup-compatibility/2006">
-        <mc:Choice xmlns:a14="http://schemas.microsoft.com/office/drawing/2010/main" Requires="a14">
+      <mc:AlternateContent xmlns:mc="http://schemas.openxmlformats.org/markup-compatibility/2006" xmlns:a14="http://schemas.microsoft.com/office/drawing/2010/main">
+        <mc:Choice Requires="a14">
           <p:sp>
             <p:nvSpPr>
               <p:cNvPr id="3" name="Content Placeholder 2"/>
@@ -28045,7 +28045,7 @@
             </p:txBody>
           </p:sp>
         </mc:Choice>
-        <mc:Fallback>
+        <mc:Fallback xmlns="">
           <p:sp>
             <p:nvSpPr>
               <p:cNvPr id="3" name="Content Placeholder 2"/>
@@ -28178,8 +28178,8 @@
           </a:p>
         </p:txBody>
       </p:sp>
-      <mc:AlternateContent xmlns:mc="http://schemas.openxmlformats.org/markup-compatibility/2006">
-        <mc:Choice xmlns:a14="http://schemas.microsoft.com/office/drawing/2010/main" Requires="a14">
+      <mc:AlternateContent xmlns:mc="http://schemas.openxmlformats.org/markup-compatibility/2006" xmlns:a14="http://schemas.microsoft.com/office/drawing/2010/main">
+        <mc:Choice Requires="a14">
           <p:sp>
             <p:nvSpPr>
               <p:cNvPr id="3" name="Content Placeholder 2"/>
@@ -28212,7 +28212,9 @@
                       <m:rPr>
                         <m:sty m:val="p"/>
                       </m:rPr>
-                      <a:rPr lang="en-US" b="0" i="0" smtClean="0"/>
+                      <a:rPr lang="en-US" b="0" i="0" smtClean="0">
+                        <a:latin typeface="Cambria Math" panose="02040503050406030204" pitchFamily="18" charset="0"/>
+                      </a:rPr>
                       <m:t>one</m:t>
                     </m:r>
                     <m:r>
@@ -28231,7 +28233,9 @@
                       <m:t>feature</m:t>
                     </m:r>
                     <m:r>
-                      <a:rPr lang="en-US" b="0" i="0" smtClean="0"/>
+                      <a:rPr lang="en-US" b="0" i="0" smtClean="0">
+                        <a:latin typeface="Cambria Math" panose="02040503050406030204" pitchFamily="18" charset="0"/>
+                      </a:rPr>
                       <m:t> </m:t>
                     </m:r>
                     <m:sSub>
@@ -29273,7 +29277,7 @@
             </p:txBody>
           </p:sp>
         </mc:Choice>
-        <mc:Fallback>
+        <mc:Fallback xmlns="">
           <p:sp>
             <p:nvSpPr>
               <p:cNvPr id="3" name="Content Placeholder 2"/>
@@ -29334,8 +29338,8 @@
           </a:p>
         </p:txBody>
       </p:sp>
-      <mc:AlternateContent xmlns:mc="http://schemas.openxmlformats.org/markup-compatibility/2006" xmlns:a14="http://schemas.microsoft.com/office/drawing/2010/main">
-        <mc:Choice Requires="a14">
+      <mc:AlternateContent xmlns:mc="http://schemas.openxmlformats.org/markup-compatibility/2006">
+        <mc:Choice xmlns:a14="http://schemas.microsoft.com/office/drawing/2010/main" Requires="a14">
           <p:graphicFrame>
             <p:nvGraphicFramePr>
               <p:cNvPr id="5" name="Table 4"/>
@@ -29345,7 +29349,7 @@
               <p:nvPr>
                 <p:extLst>
                   <p:ext uri="{D42A27DB-BD31-4B8C-83A1-F6EECF244321}">
-                    <p14:modId xmlns:p14="http://schemas.microsoft.com/office/powerpoint/2010/main" val="1006865909"/>
+                    <p14:modId xmlns:p14="http://schemas.microsoft.com/office/powerpoint/2010/main" val="2122118929"/>
                   </p:ext>
                 </p:extLst>
               </p:nvPr>
@@ -29563,7 +29567,7 @@
                         <a:p>
                           <a:r>
                             <a:rPr lang="en-US" dirty="0"/>
-                            <a:t>0</a:t>
+                            <a:t>1</a:t>
                           </a:r>
                         </a:p>
                       </a:txBody>
@@ -29622,7 +29626,7 @@
                         <a:p>
                           <a:r>
                             <a:rPr lang="en-US" dirty="0"/>
-                            <a:t>1</a:t>
+                            <a:t>0</a:t>
                           </a:r>
                         </a:p>
                       </a:txBody>
@@ -29635,7 +29639,7 @@
                         <a:p>
                           <a:r>
                             <a:rPr lang="en-US" dirty="0"/>
-                            <a:t>0</a:t>
+                            <a:t>1</a:t>
                           </a:r>
                         </a:p>
                       </a:txBody>
@@ -29694,7 +29698,7 @@
                         <a:p>
                           <a:r>
                             <a:rPr lang="en-US" dirty="0"/>
-                            <a:t>1 </a:t>
+                            <a:t>0 </a:t>
                           </a:r>
                         </a:p>
                       </a:txBody>
@@ -29707,7 +29711,7 @@
                         <a:p>
                           <a:r>
                             <a:rPr lang="en-US" dirty="0"/>
-                            <a:t>0</a:t>
+                            <a:t>1</a:t>
                           </a:r>
                         </a:p>
                       </a:txBody>
@@ -29771,7 +29775,7 @@
             </a:graphic>
           </p:graphicFrame>
         </mc:Choice>
-        <mc:Fallback xmlns="">
+        <mc:Fallback>
           <p:graphicFrame>
             <p:nvGraphicFramePr>
               <p:cNvPr id="5" name="Table 4"/>
@@ -29781,7 +29785,7 @@
               <p:nvPr>
                 <p:extLst>
                   <p:ext uri="{D42A27DB-BD31-4B8C-83A1-F6EECF244321}">
-                    <p14:modId xmlns:p14="http://schemas.microsoft.com/office/powerpoint/2010/main" val="1006865909"/>
+                    <p14:modId xmlns:p14="http://schemas.microsoft.com/office/powerpoint/2010/main" val="2122118929"/>
                   </p:ext>
                 </p:extLst>
               </p:nvPr>
@@ -29918,7 +29922,7 @@
                         <a:p>
                           <a:r>
                             <a:rPr lang="en-US" dirty="0"/>
-                            <a:t>0</a:t>
+                            <a:t>1</a:t>
                           </a:r>
                         </a:p>
                       </a:txBody>
@@ -29977,7 +29981,7 @@
                         <a:p>
                           <a:r>
                             <a:rPr lang="en-US" dirty="0"/>
-                            <a:t>1</a:t>
+                            <a:t>0</a:t>
                           </a:r>
                         </a:p>
                       </a:txBody>
@@ -29990,7 +29994,7 @@
                         <a:p>
                           <a:r>
                             <a:rPr lang="en-US" dirty="0"/>
-                            <a:t>0</a:t>
+                            <a:t>1</a:t>
                           </a:r>
                         </a:p>
                       </a:txBody>
@@ -30049,7 +30053,7 @@
                         <a:p>
                           <a:r>
                             <a:rPr lang="en-US" dirty="0"/>
-                            <a:t>1 </a:t>
+                            <a:t>0 </a:t>
                           </a:r>
                         </a:p>
                       </a:txBody>
@@ -30062,7 +30066,7 @@
                         <a:p>
                           <a:r>
                             <a:rPr lang="en-US" dirty="0"/>
-                            <a:t>0</a:t>
+                            <a:t>1</a:t>
                           </a:r>
                         </a:p>
                       </a:txBody>
@@ -31074,8 +31078,8 @@
           </a:p>
         </p:txBody>
       </p:sp>
-      <mc:AlternateContent xmlns:mc="http://schemas.openxmlformats.org/markup-compatibility/2006">
-        <mc:Choice xmlns:a14="http://schemas.microsoft.com/office/drawing/2010/main" Requires="a14">
+      <mc:AlternateContent xmlns:mc="http://schemas.openxmlformats.org/markup-compatibility/2006" xmlns:a14="http://schemas.microsoft.com/office/drawing/2010/main">
+        <mc:Choice Requires="a14">
           <p:sp>
             <p:nvSpPr>
               <p:cNvPr id="3" name="Content Placeholder 2"/>
@@ -31667,7 +31671,7 @@
             </p:txBody>
           </p:sp>
         </mc:Choice>
-        <mc:Fallback>
+        <mc:Fallback xmlns="">
           <p:sp>
             <p:nvSpPr>
               <p:cNvPr id="3" name="Content Placeholder 2"/>

</xml_diff>

<commit_message>
Updated the model selection and multi-variable slides.
</commit_message>
<xml_diff>
--- a/lectures/Lect03_MultLinRegression.pptx
+++ b/lectures/Lect03_MultLinRegression.pptx
@@ -248,7 +248,7 @@
           <a:p>
             <a:fld id="{B7D6DDD3-D7E9-488B-B626-1E8285E424D8}" type="datetimeFigureOut">
               <a:rPr lang="en-US" smtClean="0"/>
-              <a:t>9/9/2018</a:t>
+              <a:t>9/21/2018</a:t>
             </a:fld>
             <a:endParaRPr lang="en-US"/>
           </a:p>
@@ -4356,8 +4356,8 @@
           </a:p>
         </p:txBody>
       </p:sp>
-      <mc:AlternateContent xmlns:mc="http://schemas.openxmlformats.org/markup-compatibility/2006">
-        <mc:Choice xmlns:a14="http://schemas.microsoft.com/office/drawing/2010/main" Requires="a14">
+      <mc:AlternateContent xmlns:mc="http://schemas.openxmlformats.org/markup-compatibility/2006" xmlns:a14="http://schemas.microsoft.com/office/drawing/2010/main">
+        <mc:Choice Requires="a14">
           <p:sp>
             <p:nvSpPr>
               <p:cNvPr id="3" name="Content Placeholder 2"/>
@@ -5205,7 +5205,7 @@
             </p:txBody>
           </p:sp>
         </mc:Choice>
-        <mc:Fallback>
+        <mc:Fallback xmlns="">
           <p:sp>
             <p:nvSpPr>
               <p:cNvPr id="3" name="Content Placeholder 2"/>
@@ -6727,8 +6727,8 @@
           </a:p>
         </p:txBody>
       </p:sp>
-      <mc:AlternateContent xmlns:mc="http://schemas.openxmlformats.org/markup-compatibility/2006">
-        <mc:Choice xmlns:a14="http://schemas.microsoft.com/office/drawing/2010/main" Requires="a14">
+      <mc:AlternateContent xmlns:mc="http://schemas.openxmlformats.org/markup-compatibility/2006" xmlns:a14="http://schemas.microsoft.com/office/drawing/2010/main">
+        <mc:Choice Requires="a14">
           <p:sp>
             <p:nvSpPr>
               <p:cNvPr id="3" name="Content Placeholder 2"/>
@@ -7670,7 +7670,7 @@
             </p:txBody>
           </p:sp>
         </mc:Choice>
-        <mc:Fallback>
+        <mc:Fallback xmlns="">
           <p:sp>
             <p:nvSpPr>
               <p:cNvPr id="3" name="Content Placeholder 2"/>
@@ -7916,8 +7916,8 @@
           </a:p>
         </p:txBody>
       </p:sp>
-      <mc:AlternateContent xmlns:mc="http://schemas.openxmlformats.org/markup-compatibility/2006">
-        <mc:Choice xmlns:a14="http://schemas.microsoft.com/office/drawing/2010/main" Requires="a14">
+      <mc:AlternateContent xmlns:mc="http://schemas.openxmlformats.org/markup-compatibility/2006" xmlns:a14="http://schemas.microsoft.com/office/drawing/2010/main">
+        <mc:Choice Requires="a14">
           <p:sp>
             <p:nvSpPr>
               <p:cNvPr id="3" name="Content Placeholder 2"/>
@@ -8870,7 +8870,7 @@
             </p:txBody>
           </p:sp>
         </mc:Choice>
-        <mc:Fallback>
+        <mc:Fallback xmlns="">
           <p:sp>
             <p:nvSpPr>
               <p:cNvPr id="3" name="Content Placeholder 2"/>
@@ -9020,8 +9020,8 @@
           </a:p>
         </p:txBody>
       </p:sp>
-      <mc:AlternateContent xmlns:mc="http://schemas.openxmlformats.org/markup-compatibility/2006">
-        <mc:Choice xmlns:a14="http://schemas.microsoft.com/office/drawing/2010/main" Requires="a14">
+      <mc:AlternateContent xmlns:mc="http://schemas.openxmlformats.org/markup-compatibility/2006" xmlns:a14="http://schemas.microsoft.com/office/drawing/2010/main">
+        <mc:Choice Requires="a14">
           <p:sp>
             <p:nvSpPr>
               <p:cNvPr id="7" name="Content Placeholder 6">
@@ -9393,7 +9393,7 @@
             </p:txBody>
           </p:sp>
         </mc:Choice>
-        <mc:Fallback>
+        <mc:Fallback xmlns="">
           <p:sp>
             <p:nvSpPr>
               <p:cNvPr id="7" name="Content Placeholder 6">
@@ -13714,8 +13714,8 @@
           </a:p>
         </p:txBody>
       </p:sp>
-      <mc:AlternateContent xmlns:mc="http://schemas.openxmlformats.org/markup-compatibility/2006">
-        <mc:Choice xmlns:a14="http://schemas.microsoft.com/office/drawing/2010/main" Requires="a14">
+      <mc:AlternateContent xmlns:mc="http://schemas.openxmlformats.org/markup-compatibility/2006" xmlns:a14="http://schemas.microsoft.com/office/drawing/2010/main">
+        <mc:Choice Requires="a14">
           <p:sp>
             <p:nvSpPr>
               <p:cNvPr id="3" name="Content Placeholder 2"/>
@@ -14961,7 +14961,7 @@
             </p:txBody>
           </p:sp>
         </mc:Choice>
-        <mc:Fallback>
+        <mc:Fallback xmlns="">
           <p:sp>
             <p:nvSpPr>
               <p:cNvPr id="3" name="Content Placeholder 2"/>
@@ -15072,8 +15072,8 @@
           </a:p>
         </p:txBody>
       </p:sp>
-      <mc:AlternateContent xmlns:mc="http://schemas.openxmlformats.org/markup-compatibility/2006">
-        <mc:Choice xmlns:a14="http://schemas.microsoft.com/office/drawing/2010/main" Requires="a14">
+      <mc:AlternateContent xmlns:mc="http://schemas.openxmlformats.org/markup-compatibility/2006" xmlns:a14="http://schemas.microsoft.com/office/drawing/2010/main">
+        <mc:Choice Requires="a14">
           <p:sp>
             <p:nvSpPr>
               <p:cNvPr id="3" name="Content Placeholder 2"/>
@@ -16084,7 +16084,7 @@
             </p:txBody>
           </p:sp>
         </mc:Choice>
-        <mc:Fallback>
+        <mc:Fallback xmlns="">
           <p:sp>
             <p:nvSpPr>
               <p:cNvPr id="3" name="Content Placeholder 2"/>
@@ -16199,8 +16199,8 @@
           </a:p>
         </p:txBody>
       </p:sp>
-      <mc:AlternateContent xmlns:mc="http://schemas.openxmlformats.org/markup-compatibility/2006">
-        <mc:Choice xmlns:a14="http://schemas.microsoft.com/office/drawing/2010/main" Requires="a14">
+      <mc:AlternateContent xmlns:mc="http://schemas.openxmlformats.org/markup-compatibility/2006" xmlns:a14="http://schemas.microsoft.com/office/drawing/2010/main">
+        <mc:Choice Requires="a14">
           <p:sp>
             <p:nvSpPr>
               <p:cNvPr id="3" name="Content Placeholder 2">
@@ -17239,7 +17239,7 @@
             </p:txBody>
           </p:sp>
         </mc:Choice>
-        <mc:Fallback>
+        <mc:Fallback xmlns="">
           <p:sp>
             <p:nvSpPr>
               <p:cNvPr id="3" name="Content Placeholder 2">
@@ -18134,8 +18134,8 @@
           </a:p>
         </p:txBody>
       </p:sp>
-      <mc:AlternateContent xmlns:mc="http://schemas.openxmlformats.org/markup-compatibility/2006">
-        <mc:Choice xmlns:a14="http://schemas.microsoft.com/office/drawing/2010/main" Requires="a14">
+      <mc:AlternateContent xmlns:mc="http://schemas.openxmlformats.org/markup-compatibility/2006" xmlns:a14="http://schemas.microsoft.com/office/drawing/2010/main">
+        <mc:Choice Requires="a14">
           <p:sp>
             <p:nvSpPr>
               <p:cNvPr id="3" name="Content Placeholder 2"/>
@@ -20160,7 +20160,7 @@
             </p:txBody>
           </p:sp>
         </mc:Choice>
-        <mc:Fallback>
+        <mc:Fallback xmlns="">
           <p:sp>
             <p:nvSpPr>
               <p:cNvPr id="3" name="Content Placeholder 2"/>
@@ -27226,8 +27226,8 @@
           </a:p>
         </p:txBody>
       </p:sp>
-      <mc:AlternateContent xmlns:mc="http://schemas.openxmlformats.org/markup-compatibility/2006">
-        <mc:Choice xmlns:a14="http://schemas.microsoft.com/office/drawing/2010/main" Requires="a14">
+      <mc:AlternateContent xmlns:mc="http://schemas.openxmlformats.org/markup-compatibility/2006" xmlns:a14="http://schemas.microsoft.com/office/drawing/2010/main">
+        <mc:Choice Requires="a14">
           <p:sp>
             <p:nvSpPr>
               <p:cNvPr id="3" name="Content Placeholder 2"/>
@@ -28349,7 +28349,7 @@
             </p:txBody>
           </p:sp>
         </mc:Choice>
-        <mc:Fallback>
+        <mc:Fallback xmlns="">
           <p:sp>
             <p:nvSpPr>
               <p:cNvPr id="3" name="Content Placeholder 2"/>
@@ -28410,8 +28410,8 @@
           </a:p>
         </p:txBody>
       </p:sp>
-      <mc:AlternateContent xmlns:mc="http://schemas.openxmlformats.org/markup-compatibility/2006">
-        <mc:Choice xmlns:a14="http://schemas.microsoft.com/office/drawing/2010/main" Requires="a14">
+      <mc:AlternateContent xmlns:mc="http://schemas.openxmlformats.org/markup-compatibility/2006" xmlns:a14="http://schemas.microsoft.com/office/drawing/2010/main">
+        <mc:Choice Requires="a14">
           <p:graphicFrame>
             <p:nvGraphicFramePr>
               <p:cNvPr id="5" name="Table 4"/>
@@ -28709,7 +28709,7 @@
             </a:graphic>
           </p:graphicFrame>
         </mc:Choice>
-        <mc:Fallback>
+        <mc:Fallback xmlns="">
           <p:graphicFrame>
             <p:nvGraphicFramePr>
               <p:cNvPr id="5" name="Table 4"/>

</xml_diff>